<commit_message>
Backlight colors and fading color picker
</commit_message>
<xml_diff>
--- a/LED_Remote_Vis_DualArduSetup/Manual.pptx
+++ b/LED_Remote_Vis_DualArduSetup/Manual.pptx
@@ -289,7 +289,7 @@
           <a:p>
             <a:fld id="{1BA50D42-C9CD-4801-B293-61D1F53EC57E}" type="datetimeFigureOut">
               <a:rPr lang="de-DE" smtClean="0"/>
-              <a:t>12.08.2017</a:t>
+              <a:t>18.08.2017</a:t>
             </a:fld>
             <a:endParaRPr lang="de-DE" dirty="0"/>
           </a:p>
@@ -454,7 +454,7 @@
           <a:p>
             <a:fld id="{1BA50D42-C9CD-4801-B293-61D1F53EC57E}" type="datetimeFigureOut">
               <a:rPr lang="de-DE" smtClean="0"/>
-              <a:t>12.08.2017</a:t>
+              <a:t>18.08.2017</a:t>
             </a:fld>
             <a:endParaRPr lang="de-DE" dirty="0"/>
           </a:p>
@@ -629,7 +629,7 @@
           <a:p>
             <a:fld id="{1BA50D42-C9CD-4801-B293-61D1F53EC57E}" type="datetimeFigureOut">
               <a:rPr lang="de-DE" smtClean="0"/>
-              <a:t>12.08.2017</a:t>
+              <a:t>18.08.2017</a:t>
             </a:fld>
             <a:endParaRPr lang="de-DE" dirty="0"/>
           </a:p>
@@ -794,7 +794,7 @@
           <a:p>
             <a:fld id="{1BA50D42-C9CD-4801-B293-61D1F53EC57E}" type="datetimeFigureOut">
               <a:rPr lang="de-DE" smtClean="0"/>
-              <a:t>12.08.2017</a:t>
+              <a:t>18.08.2017</a:t>
             </a:fld>
             <a:endParaRPr lang="de-DE" dirty="0"/>
           </a:p>
@@ -1035,7 +1035,7 @@
           <a:p>
             <a:fld id="{1BA50D42-C9CD-4801-B293-61D1F53EC57E}" type="datetimeFigureOut">
               <a:rPr lang="de-DE" smtClean="0"/>
-              <a:t>12.08.2017</a:t>
+              <a:t>18.08.2017</a:t>
             </a:fld>
             <a:endParaRPr lang="de-DE" dirty="0"/>
           </a:p>
@@ -1318,7 +1318,7 @@
           <a:p>
             <a:fld id="{1BA50D42-C9CD-4801-B293-61D1F53EC57E}" type="datetimeFigureOut">
               <a:rPr lang="de-DE" smtClean="0"/>
-              <a:t>12.08.2017</a:t>
+              <a:t>18.08.2017</a:t>
             </a:fld>
             <a:endParaRPr lang="de-DE" dirty="0"/>
           </a:p>
@@ -1735,7 +1735,7 @@
           <a:p>
             <a:fld id="{1BA50D42-C9CD-4801-B293-61D1F53EC57E}" type="datetimeFigureOut">
               <a:rPr lang="de-DE" smtClean="0"/>
-              <a:t>12.08.2017</a:t>
+              <a:t>18.08.2017</a:t>
             </a:fld>
             <a:endParaRPr lang="de-DE" dirty="0"/>
           </a:p>
@@ -1848,7 +1848,7 @@
           <a:p>
             <a:fld id="{1BA50D42-C9CD-4801-B293-61D1F53EC57E}" type="datetimeFigureOut">
               <a:rPr lang="de-DE" smtClean="0"/>
-              <a:t>12.08.2017</a:t>
+              <a:t>18.08.2017</a:t>
             </a:fld>
             <a:endParaRPr lang="de-DE" dirty="0"/>
           </a:p>
@@ -1938,7 +1938,7 @@
           <a:p>
             <a:fld id="{1BA50D42-C9CD-4801-B293-61D1F53EC57E}" type="datetimeFigureOut">
               <a:rPr lang="de-DE" smtClean="0"/>
-              <a:t>12.08.2017</a:t>
+              <a:t>18.08.2017</a:t>
             </a:fld>
             <a:endParaRPr lang="de-DE" dirty="0"/>
           </a:p>
@@ -2210,7 +2210,7 @@
           <a:p>
             <a:fld id="{1BA50D42-C9CD-4801-B293-61D1F53EC57E}" type="datetimeFigureOut">
               <a:rPr lang="de-DE" smtClean="0"/>
-              <a:t>12.08.2017</a:t>
+              <a:t>18.08.2017</a:t>
             </a:fld>
             <a:endParaRPr lang="de-DE" dirty="0"/>
           </a:p>
@@ -2458,7 +2458,7 @@
           <a:p>
             <a:fld id="{1BA50D42-C9CD-4801-B293-61D1F53EC57E}" type="datetimeFigureOut">
               <a:rPr lang="de-DE" smtClean="0"/>
-              <a:t>12.08.2017</a:t>
+              <a:t>18.08.2017</a:t>
             </a:fld>
             <a:endParaRPr lang="de-DE" dirty="0"/>
           </a:p>
@@ -2666,7 +2666,7 @@
           <a:p>
             <a:fld id="{1BA50D42-C9CD-4801-B293-61D1F53EC57E}" type="datetimeFigureOut">
               <a:rPr lang="de-DE" smtClean="0"/>
-              <a:t>12.08.2017</a:t>
+              <a:t>18.08.2017</a:t>
             </a:fld>
             <a:endParaRPr lang="de-DE" dirty="0"/>
           </a:p>
@@ -3409,11 +3409,7 @@
                       <a:pPr algn="ctr"/>
                       <a:r>
                         <a:rPr lang="en-US" noProof="0" dirty="0" smtClean="0"/>
-                        <a:t>5-11 13-14 </a:t>
-                      </a:r>
-                      <a:r>
-                        <a:rPr lang="en-US" noProof="0" dirty="0" smtClean="0"/>
-                        <a:t>17-19 21-23</a:t>
+                        <a:t>5-11 13-14 17-19 21-23</a:t>
                       </a:r>
                       <a:endParaRPr lang="en-US" noProof="0" dirty="0"/>
                     </a:p>
@@ -3526,11 +3522,7 @@
                       <a:pPr algn="ctr"/>
                       <a:r>
                         <a:rPr lang="en-US" noProof="0" dirty="0" smtClean="0"/>
-                        <a:t>Change color </a:t>
-                      </a:r>
-                      <a:r>
-                        <a:rPr lang="en-US" noProof="0" smtClean="0"/>
-                        <a:t>to custom one</a:t>
+                        <a:t>Change color to custom one</a:t>
                       </a:r>
                       <a:endParaRPr lang="en-US" noProof="0" dirty="0"/>
                     </a:p>
@@ -6350,6 +6342,52 @@
           </a:p>
         </p:txBody>
       </p:sp>
+      <p:sp>
+        <p:nvSpPr>
+          <p:cNvPr id="36" name="Textfeld 35"/>
+          <p:cNvSpPr txBox="1"/>
+          <p:nvPr/>
+        </p:nvSpPr>
+        <p:spPr>
+          <a:xfrm>
+            <a:off x="4169478" y="4118014"/>
+            <a:ext cx="4155433" cy="892552"/>
+          </a:xfrm>
+          <a:prstGeom prst="rect">
+            <a:avLst/>
+          </a:prstGeom>
+          <a:noFill/>
+        </p:spPr>
+        <p:txBody>
+          <a:bodyPr wrap="none" rtlCol="0">
+            <a:spAutoFit/>
+          </a:bodyPr>
+          <a:lstStyle/>
+          <a:p>
+            <a:r>
+              <a:rPr lang="en-US" sz="2000" dirty="0" smtClean="0"/>
+              <a:t>Turning off causes saving</a:t>
+            </a:r>
+          </a:p>
+          <a:p>
+            <a:r>
+              <a:rPr lang="en-US" sz="2000" dirty="0" smtClean="0"/>
+              <a:t>settings on EEPROM. </a:t>
+            </a:r>
+            <a:r>
+              <a:rPr lang="en-US" sz="1100" dirty="0">
+                <a:solidFill>
+                  <a:srgbClr val="FF0000"/>
+                </a:solidFill>
+              </a:rPr>
+              <a:t>(Only 100,000 write cycles!)</a:t>
+            </a:r>
+          </a:p>
+          <a:p>
+            <a:endParaRPr lang="de-DE" sz="1100" dirty="0"/>
+          </a:p>
+        </p:txBody>
+      </p:sp>
     </p:spTree>
     <p:extLst>
       <p:ext uri="{BB962C8B-B14F-4D97-AF65-F5344CB8AC3E}">
@@ -6389,14 +6427,14 @@
           <p:nvPr>
             <p:extLst>
               <p:ext uri="{D42A27DB-BD31-4B8C-83A1-F6EECF244321}">
-                <p14:modId xmlns:p14="http://schemas.microsoft.com/office/powerpoint/2010/main" val="342660266"/>
+                <p14:modId xmlns:p14="http://schemas.microsoft.com/office/powerpoint/2010/main" val="2247934261"/>
               </p:ext>
             </p:extLst>
           </p:nvPr>
         </p:nvGraphicFramePr>
         <p:xfrm>
           <a:off x="4139952" y="12816"/>
-          <a:ext cx="5004048" cy="6858000"/>
+          <a:ext cx="5004048" cy="3566160"/>
         </p:xfrm>
         <a:graphic>
           <a:graphicData uri="http://schemas.openxmlformats.org/drawingml/2006/table">
@@ -6632,7 +6670,7 @@
                       <a:pPr algn="ctr"/>
                       <a:r>
                         <a:rPr lang="en-US" noProof="0" dirty="0" smtClean="0"/>
-                        <a:t>5</a:t>
+                        <a:t>5-11 13-14 17-19 21-23</a:t>
                       </a:r>
                       <a:endParaRPr lang="en-US" noProof="0" dirty="0"/>
                     </a:p>
@@ -6647,11 +6685,18 @@
                       <a:pPr algn="ctr"/>
                       <a:r>
                         <a:rPr lang="en-US" noProof="0" dirty="0" smtClean="0"/>
-                        <a:t>Manually</a:t>
+                        <a:t>Change backlight color</a:t>
+                      </a:r>
+                      <a:br>
+                        <a:rPr lang="en-US" noProof="0" dirty="0" smtClean="0"/>
+                      </a:br>
+                      <a:r>
+                        <a:rPr lang="en-US" noProof="0" dirty="0" smtClean="0"/>
+                        <a:t>8 = warm</a:t>
                       </a:r>
                       <a:r>
                         <a:rPr lang="en-US" baseline="0" noProof="0" dirty="0" smtClean="0"/>
-                        <a:t> add 5 to red</a:t>
+                        <a:t> white</a:t>
                       </a:r>
                       <a:endParaRPr lang="en-US" noProof="0" dirty="0"/>
                     </a:p>
@@ -6668,7 +6713,7 @@
                       <a:pPr algn="ctr"/>
                       <a:r>
                         <a:rPr lang="en-US" noProof="0" dirty="0" smtClean="0"/>
-                        <a:t>6</a:t>
+                        <a:t>12</a:t>
                       </a:r>
                       <a:endParaRPr lang="en-US" noProof="0" dirty="0"/>
                     </a:p>
@@ -6699,11 +6744,11 @@
                       </a:pPr>
                       <a:r>
                         <a:rPr lang="en-US" noProof="0" dirty="0" smtClean="0"/>
-                        <a:t>Manually</a:t>
+                        <a:t>Show</a:t>
                       </a:r>
                       <a:r>
                         <a:rPr lang="en-US" baseline="0" noProof="0" dirty="0" smtClean="0"/>
-                        <a:t> add 5 to green</a:t>
+                        <a:t> colors by fading through spectrum*</a:t>
                       </a:r>
                       <a:endParaRPr lang="en-US" noProof="0" dirty="0" smtClean="0"/>
                     </a:p>
@@ -6720,7 +6765,7 @@
                       <a:pPr algn="ctr"/>
                       <a:r>
                         <a:rPr lang="en-US" noProof="0" dirty="0" smtClean="0"/>
-                        <a:t>7</a:t>
+                        <a:t>16</a:t>
                       </a:r>
                       <a:endParaRPr lang="en-US" noProof="0" dirty="0"/>
                     </a:p>
@@ -6751,457 +6796,13 @@
                       </a:pPr>
                       <a:r>
                         <a:rPr lang="en-US" noProof="0" dirty="0" smtClean="0"/>
-                        <a:t>Manually</a:t>
+                        <a:t>Toggle keystroke showing (green</a:t>
                       </a:r>
                       <a:r>
                         <a:rPr lang="en-US" baseline="0" noProof="0" dirty="0" smtClean="0"/>
-                        <a:t> add 5 to blue</a:t>
+                        <a:t> flash)</a:t>
                       </a:r>
                       <a:endParaRPr lang="en-US" noProof="0" dirty="0" smtClean="0"/>
-                    </a:p>
-                  </a:txBody>
-                  <a:tcPr marL="0" marR="0" marT="0" marB="0" anchor="ctr"/>
-                </a:tc>
-              </a:tr>
-              <a:tr h="257621">
-                <a:tc>
-                  <a:txBody>
-                    <a:bodyPr/>
-                    <a:lstStyle/>
-                    <a:p>
-                      <a:pPr algn="ctr"/>
-                      <a:r>
-                        <a:rPr lang="en-US" noProof="0" dirty="0" smtClean="0"/>
-                        <a:t>8</a:t>
-                      </a:r>
-                      <a:endParaRPr lang="en-US" noProof="0" dirty="0"/>
-                    </a:p>
-                  </a:txBody>
-                  <a:tcPr marL="0" marR="0" marT="0" marB="0" anchor="ctr"/>
-                </a:tc>
-                <a:tc>
-                  <a:txBody>
-                    <a:bodyPr/>
-                    <a:lstStyle/>
-                    <a:p>
-                      <a:pPr algn="ctr"/>
-                      <a:r>
-                        <a:rPr lang="en-US" noProof="0" dirty="0" smtClean="0"/>
-                        <a:t>Load custom</a:t>
-                      </a:r>
-                      <a:r>
-                        <a:rPr lang="en-US" baseline="0" noProof="0" dirty="0" smtClean="0"/>
-                        <a:t> color</a:t>
-                      </a:r>
-                      <a:endParaRPr lang="en-US" noProof="0" dirty="0"/>
-                    </a:p>
-                  </a:txBody>
-                  <a:tcPr marL="0" marR="0" marT="0" marB="0" anchor="ctr"/>
-                </a:tc>
-              </a:tr>
-              <a:tr h="257621">
-                <a:tc>
-                  <a:txBody>
-                    <a:bodyPr/>
-                    <a:lstStyle/>
-                    <a:p>
-                      <a:pPr algn="ctr"/>
-                      <a:r>
-                        <a:rPr lang="en-US" noProof="0" dirty="0" smtClean="0"/>
-                        <a:t>9</a:t>
-                      </a:r>
-                      <a:endParaRPr lang="en-US" noProof="0" dirty="0"/>
-                    </a:p>
-                  </a:txBody>
-                  <a:tcPr marL="0" marR="0" marT="0" marB="0" anchor="ctr"/>
-                </a:tc>
-                <a:tc>
-                  <a:txBody>
-                    <a:bodyPr/>
-                    <a:lstStyle/>
-                    <a:p>
-                      <a:pPr algn="ctr"/>
-                      <a:r>
-                        <a:rPr lang="en-US" noProof="0" dirty="0" smtClean="0"/>
-                        <a:t>Manually</a:t>
-                      </a:r>
-                      <a:r>
-                        <a:rPr lang="en-US" baseline="0" noProof="0" dirty="0" smtClean="0"/>
-                        <a:t> reduce 5 from red</a:t>
-                      </a:r>
-                      <a:endParaRPr lang="en-US" noProof="0" dirty="0"/>
-                    </a:p>
-                  </a:txBody>
-                  <a:tcPr marL="0" marR="0" marT="0" marB="0" anchor="ctr"/>
-                </a:tc>
-              </a:tr>
-              <a:tr h="257621">
-                <a:tc>
-                  <a:txBody>
-                    <a:bodyPr/>
-                    <a:lstStyle/>
-                    <a:p>
-                      <a:pPr algn="ctr"/>
-                      <a:r>
-                        <a:rPr lang="en-US" noProof="0" dirty="0" smtClean="0"/>
-                        <a:t>10</a:t>
-                      </a:r>
-                      <a:endParaRPr lang="en-US" noProof="0" dirty="0"/>
-                    </a:p>
-                  </a:txBody>
-                  <a:tcPr marL="0" marR="0" marT="0" marB="0" anchor="ctr"/>
-                </a:tc>
-                <a:tc>
-                  <a:txBody>
-                    <a:bodyPr/>
-                    <a:lstStyle/>
-                    <a:p>
-                      <a:pPr marL="0" marR="0" indent="0" algn="ctr" defTabSz="914400" rtl="0" eaLnBrk="1" fontAlgn="auto" latinLnBrk="0" hangingPunct="1">
-                        <a:lnSpc>
-                          <a:spcPct val="100000"/>
-                        </a:lnSpc>
-                        <a:spcBef>
-                          <a:spcPts val="0"/>
-                        </a:spcBef>
-                        <a:spcAft>
-                          <a:spcPts val="0"/>
-                        </a:spcAft>
-                        <a:buClrTx/>
-                        <a:buSzTx/>
-                        <a:buFontTx/>
-                        <a:buNone/>
-                        <a:tabLst/>
-                        <a:defRPr/>
-                      </a:pPr>
-                      <a:r>
-                        <a:rPr lang="en-US" noProof="0" dirty="0" smtClean="0"/>
-                        <a:t>Manually</a:t>
-                      </a:r>
-                      <a:r>
-                        <a:rPr lang="en-US" baseline="0" noProof="0" dirty="0" smtClean="0"/>
-                        <a:t> reduce 5 from </a:t>
-                      </a:r>
-                      <a:r>
-                        <a:rPr lang="en-US" baseline="0" noProof="0" dirty="0" smtClean="0"/>
-                        <a:t>green</a:t>
-                      </a:r>
-                      <a:endParaRPr lang="en-US" noProof="0" dirty="0" smtClean="0"/>
-                    </a:p>
-                  </a:txBody>
-                  <a:tcPr marL="0" marR="0" marT="0" marB="0" anchor="ctr"/>
-                </a:tc>
-              </a:tr>
-              <a:tr h="257621">
-                <a:tc>
-                  <a:txBody>
-                    <a:bodyPr/>
-                    <a:lstStyle/>
-                    <a:p>
-                      <a:pPr algn="ctr"/>
-                      <a:r>
-                        <a:rPr lang="en-US" noProof="0" dirty="0" smtClean="0"/>
-                        <a:t>11</a:t>
-                      </a:r>
-                      <a:endParaRPr lang="en-US" noProof="0" dirty="0"/>
-                    </a:p>
-                  </a:txBody>
-                  <a:tcPr marL="0" marR="0" marT="0" marB="0" anchor="ctr"/>
-                </a:tc>
-                <a:tc>
-                  <a:txBody>
-                    <a:bodyPr/>
-                    <a:lstStyle/>
-                    <a:p>
-                      <a:pPr marL="0" marR="0" indent="0" algn="ctr" defTabSz="914400" rtl="0" eaLnBrk="1" fontAlgn="auto" latinLnBrk="0" hangingPunct="1">
-                        <a:lnSpc>
-                          <a:spcPct val="100000"/>
-                        </a:lnSpc>
-                        <a:spcBef>
-                          <a:spcPts val="0"/>
-                        </a:spcBef>
-                        <a:spcAft>
-                          <a:spcPts val="0"/>
-                        </a:spcAft>
-                        <a:buClrTx/>
-                        <a:buSzTx/>
-                        <a:buFontTx/>
-                        <a:buNone/>
-                        <a:tabLst/>
-                        <a:defRPr/>
-                      </a:pPr>
-                      <a:r>
-                        <a:rPr lang="en-US" noProof="0" dirty="0" smtClean="0"/>
-                        <a:t>Manually</a:t>
-                      </a:r>
-                      <a:r>
-                        <a:rPr lang="en-US" baseline="0" noProof="0" dirty="0" smtClean="0"/>
-                        <a:t> reduce 5 from </a:t>
-                      </a:r>
-                      <a:r>
-                        <a:rPr lang="en-US" baseline="0" noProof="0" dirty="0" smtClean="0"/>
-                        <a:t>blue</a:t>
-                      </a:r>
-                      <a:endParaRPr lang="en-US" noProof="0" dirty="0" smtClean="0"/>
-                    </a:p>
-                  </a:txBody>
-                  <a:tcPr marL="0" marR="0" marT="0" marB="0" anchor="ctr"/>
-                </a:tc>
-              </a:tr>
-              <a:tr h="257621">
-                <a:tc>
-                  <a:txBody>
-                    <a:bodyPr/>
-                    <a:lstStyle/>
-                    <a:p>
-                      <a:pPr algn="ctr"/>
-                      <a:r>
-                        <a:rPr lang="en-US" noProof="0" dirty="0" smtClean="0"/>
-                        <a:t>12</a:t>
-                      </a:r>
-                      <a:endParaRPr lang="en-US" noProof="0" dirty="0"/>
-                    </a:p>
-                  </a:txBody>
-                  <a:tcPr marL="0" marR="0" marT="0" marB="0" anchor="ctr"/>
-                </a:tc>
-                <a:tc>
-                  <a:txBody>
-                    <a:bodyPr/>
-                    <a:lstStyle/>
-                    <a:p>
-                      <a:pPr algn="ctr"/>
-                      <a:r>
-                        <a:rPr lang="en-US" noProof="0" dirty="0" smtClean="0"/>
-                        <a:t>Save custom color</a:t>
-                      </a:r>
-                      <a:endParaRPr lang="en-US" noProof="0" dirty="0"/>
-                    </a:p>
-                  </a:txBody>
-                  <a:tcPr marL="0" marR="0" marT="0" marB="0" anchor="ctr"/>
-                </a:tc>
-              </a:tr>
-              <a:tr h="257621">
-                <a:tc>
-                  <a:txBody>
-                    <a:bodyPr/>
-                    <a:lstStyle/>
-                    <a:p>
-                      <a:pPr algn="ctr"/>
-                      <a:r>
-                        <a:rPr lang="en-US" noProof="0" dirty="0" smtClean="0"/>
-                        <a:t>13</a:t>
-                      </a:r>
-                      <a:endParaRPr lang="en-US" noProof="0" dirty="0"/>
-                    </a:p>
-                  </a:txBody>
-                  <a:tcPr marL="0" marR="0" marT="0" marB="0" anchor="ctr"/>
-                </a:tc>
-                <a:tc>
-                  <a:txBody>
-                    <a:bodyPr/>
-                    <a:lstStyle/>
-                    <a:p>
-                      <a:pPr algn="ctr"/>
-                      <a:r>
-                        <a:rPr lang="en-US" noProof="0" dirty="0" smtClean="0"/>
-                        <a:t>-</a:t>
-                      </a:r>
-                      <a:endParaRPr lang="en-US" noProof="0" dirty="0"/>
-                    </a:p>
-                  </a:txBody>
-                  <a:tcPr marL="0" marR="0" marT="0" marB="0" anchor="ctr"/>
-                </a:tc>
-              </a:tr>
-              <a:tr h="257621">
-                <a:tc>
-                  <a:txBody>
-                    <a:bodyPr/>
-                    <a:lstStyle/>
-                    <a:p>
-                      <a:pPr algn="ctr"/>
-                      <a:r>
-                        <a:rPr lang="en-US" noProof="0" dirty="0" smtClean="0"/>
-                        <a:t>14</a:t>
-                      </a:r>
-                      <a:endParaRPr lang="en-US" noProof="0" dirty="0"/>
-                    </a:p>
-                  </a:txBody>
-                  <a:tcPr marL="0" marR="0" marT="0" marB="0" anchor="ctr"/>
-                </a:tc>
-                <a:tc>
-                  <a:txBody>
-                    <a:bodyPr/>
-                    <a:lstStyle/>
-                    <a:p>
-                      <a:pPr algn="ctr"/>
-                      <a:r>
-                        <a:rPr lang="en-US" noProof="0" dirty="0" smtClean="0"/>
-                        <a:t>-</a:t>
-                      </a:r>
-                      <a:endParaRPr lang="en-US" noProof="0" dirty="0"/>
-                    </a:p>
-                  </a:txBody>
-                  <a:tcPr marL="0" marR="0" marT="0" marB="0" anchor="ctr"/>
-                </a:tc>
-              </a:tr>
-              <a:tr h="257621">
-                <a:tc>
-                  <a:txBody>
-                    <a:bodyPr/>
-                    <a:lstStyle/>
-                    <a:p>
-                      <a:pPr algn="ctr"/>
-                      <a:r>
-                        <a:rPr lang="en-US" noProof="0" dirty="0" smtClean="0"/>
-                        <a:t>15</a:t>
-                      </a:r>
-                      <a:endParaRPr lang="en-US" noProof="0" dirty="0"/>
-                    </a:p>
-                  </a:txBody>
-                  <a:tcPr marL="0" marR="0" marT="0" marB="0" anchor="ctr"/>
-                </a:tc>
-                <a:tc>
-                  <a:txBody>
-                    <a:bodyPr/>
-                    <a:lstStyle/>
-                    <a:p>
-                      <a:pPr algn="ctr"/>
-                      <a:r>
-                        <a:rPr lang="en-US" noProof="0" dirty="0" smtClean="0"/>
-                        <a:t>-</a:t>
-                      </a:r>
-                      <a:endParaRPr lang="en-US" noProof="0" dirty="0"/>
-                    </a:p>
-                  </a:txBody>
-                  <a:tcPr marL="0" marR="0" marT="0" marB="0" anchor="ctr"/>
-                </a:tc>
-              </a:tr>
-              <a:tr h="257621">
-                <a:tc>
-                  <a:txBody>
-                    <a:bodyPr/>
-                    <a:lstStyle/>
-                    <a:p>
-                      <a:pPr algn="ctr"/>
-                      <a:r>
-                        <a:rPr lang="en-US" noProof="0" dirty="0" smtClean="0"/>
-                        <a:t>16</a:t>
-                      </a:r>
-                      <a:endParaRPr lang="en-US" noProof="0" dirty="0"/>
-                    </a:p>
-                  </a:txBody>
-                  <a:tcPr marL="0" marR="0" marT="0" marB="0" anchor="ctr"/>
-                </a:tc>
-                <a:tc>
-                  <a:txBody>
-                    <a:bodyPr/>
-                    <a:lstStyle/>
-                    <a:p>
-                      <a:pPr algn="ctr"/>
-                      <a:r>
-                        <a:rPr lang="en-US" noProof="0" dirty="0" smtClean="0"/>
-                        <a:t>Toggle</a:t>
-                      </a:r>
-                      <a:r>
-                        <a:rPr lang="en-US" baseline="0" noProof="0" dirty="0" smtClean="0"/>
-                        <a:t> 'shiftOneRight'</a:t>
-                      </a:r>
-                      <a:endParaRPr lang="en-US" noProof="0" dirty="0"/>
-                    </a:p>
-                  </a:txBody>
-                  <a:tcPr marL="0" marR="0" marT="0" marB="0" anchor="ctr"/>
-                </a:tc>
-              </a:tr>
-              <a:tr h="257621">
-                <a:tc>
-                  <a:txBody>
-                    <a:bodyPr/>
-                    <a:lstStyle/>
-                    <a:p>
-                      <a:pPr algn="ctr"/>
-                      <a:r>
-                        <a:rPr lang="en-US" noProof="0" dirty="0" smtClean="0"/>
-                        <a:t>17</a:t>
-                      </a:r>
-                      <a:endParaRPr lang="en-US" noProof="0" dirty="0"/>
-                    </a:p>
-                  </a:txBody>
-                  <a:tcPr marL="0" marR="0" marT="0" marB="0" anchor="ctr"/>
-                </a:tc>
-                <a:tc>
-                  <a:txBody>
-                    <a:bodyPr/>
-                    <a:lstStyle/>
-                    <a:p>
-                      <a:pPr algn="ctr"/>
-                      <a:r>
-                        <a:rPr lang="en-US" noProof="0" dirty="0" smtClean="0"/>
-                        <a:t>-</a:t>
-                      </a:r>
-                      <a:endParaRPr lang="en-US" noProof="0" dirty="0"/>
-                    </a:p>
-                  </a:txBody>
-                  <a:tcPr marL="0" marR="0" marT="0" marB="0" anchor="ctr"/>
-                </a:tc>
-              </a:tr>
-              <a:tr h="257621">
-                <a:tc>
-                  <a:txBody>
-                    <a:bodyPr/>
-                    <a:lstStyle/>
-                    <a:p>
-                      <a:pPr algn="ctr"/>
-                      <a:r>
-                        <a:rPr lang="en-US" noProof="0" dirty="0" smtClean="0"/>
-                        <a:t>18</a:t>
-                      </a:r>
-                      <a:endParaRPr lang="en-US" noProof="0" dirty="0"/>
-                    </a:p>
-                  </a:txBody>
-                  <a:tcPr marL="0" marR="0" marT="0" marB="0" anchor="ctr"/>
-                </a:tc>
-                <a:tc>
-                  <a:txBody>
-                    <a:bodyPr/>
-                    <a:lstStyle/>
-                    <a:p>
-                      <a:pPr algn="ctr"/>
-                      <a:r>
-                        <a:rPr lang="en-US" noProof="0" dirty="0" smtClean="0"/>
-                        <a:t>-</a:t>
-                      </a:r>
-                      <a:endParaRPr lang="en-US" noProof="0" dirty="0"/>
-                    </a:p>
-                  </a:txBody>
-                  <a:tcPr marL="0" marR="0" marT="0" marB="0" anchor="ctr"/>
-                </a:tc>
-              </a:tr>
-              <a:tr h="257621">
-                <a:tc>
-                  <a:txBody>
-                    <a:bodyPr/>
-                    <a:lstStyle/>
-                    <a:p>
-                      <a:pPr algn="ctr"/>
-                      <a:r>
-                        <a:rPr lang="en-US" noProof="0" dirty="0" smtClean="0"/>
-                        <a:t>19</a:t>
-                      </a:r>
-                      <a:endParaRPr lang="en-US" noProof="0" dirty="0"/>
-                    </a:p>
-                  </a:txBody>
-                  <a:tcPr marL="0" marR="0" marT="0" marB="0" anchor="ctr"/>
-                </a:tc>
-                <a:tc>
-                  <a:txBody>
-                    <a:bodyPr/>
-                    <a:lstStyle/>
-                    <a:p>
-                      <a:pPr algn="ctr"/>
-                      <a:r>
-                        <a:rPr lang="en-US" noProof="0" dirty="0" smtClean="0"/>
-                        <a:t>-</a:t>
-                      </a:r>
-                      <a:endParaRPr lang="en-US" noProof="0" dirty="0"/>
                     </a:p>
                   </a:txBody>
                   <a:tcPr marL="0" marR="0" marT="0" marB="0" anchor="ctr"/>
@@ -7228,136 +6829,40 @@
                     <a:bodyPr/>
                     <a:lstStyle/>
                     <a:p>
-                      <a:pPr algn="ctr"/>
+                      <a:pPr marL="0" marR="0" lvl="0" indent="0" algn="ctr" defTabSz="914400" rtl="0" eaLnBrk="1" fontAlgn="auto" latinLnBrk="0" hangingPunct="1">
+                        <a:lnSpc>
+                          <a:spcPct val="100000"/>
+                        </a:lnSpc>
+                        <a:spcBef>
+                          <a:spcPts val="0"/>
+                        </a:spcBef>
+                        <a:spcAft>
+                          <a:spcPts val="0"/>
+                        </a:spcAft>
+                        <a:buClrTx/>
+                        <a:buSzTx/>
+                        <a:buFontTx/>
+                        <a:buNone/>
+                        <a:tabLst/>
+                        <a:defRPr/>
+                      </a:pPr>
                       <a:r>
-                        <a:rPr lang="en-US" sz="1600" noProof="0" dirty="0" smtClean="0"/>
-                        <a:t>Manually save </a:t>
+                        <a:rPr kumimoji="0" lang="en-US" sz="1800" b="0" i="0" u="none" strike="noStrike" kern="1200" cap="none" spc="0" normalizeH="0" baseline="0" noProof="0" dirty="0" smtClean="0">
+                          <a:ln>
+                            <a:noFill/>
+                          </a:ln>
+                          <a:solidFill>
+                            <a:prstClr val="black"/>
+                          </a:solidFill>
+                          <a:effectLst/>
+                          <a:uLnTx/>
+                          <a:uFillTx/>
+                          <a:latin typeface="+mn-lt"/>
+                          <a:ea typeface="+mn-ea"/>
+                          <a:cs typeface="+mn-cs"/>
+                        </a:rPr>
+                        <a:t>Toggle 'shiftOneRight'</a:t>
                       </a:r>
-                      <a:r>
-                        <a:rPr lang="en-US" sz="1600" baseline="0" noProof="0" dirty="0" smtClean="0"/>
-                        <a:t>settings to </a:t>
-                      </a:r>
-                      <a:r>
-                        <a:rPr lang="en-US" sz="1600" noProof="0" dirty="0" smtClean="0"/>
-                        <a:t>EEPROM</a:t>
-                      </a:r>
-                      <a:r>
-                        <a:rPr lang="en-US" sz="1600" baseline="0" noProof="0" dirty="0" smtClean="0"/>
-                        <a:t> </a:t>
-                      </a:r>
-                      <a:r>
-                        <a:rPr lang="en-US" sz="1000" baseline="0" noProof="0" dirty="0" smtClean="0">
-                          <a:solidFill>
-                            <a:srgbClr val="FF0000"/>
-                          </a:solidFill>
-                        </a:rPr>
-                        <a:t>(Only 100,000 write cycles!)</a:t>
-                      </a:r>
-                      <a:endParaRPr lang="en-US" sz="1000" noProof="0" dirty="0">
-                        <a:solidFill>
-                          <a:srgbClr val="FF0000"/>
-                        </a:solidFill>
-                      </a:endParaRPr>
-                    </a:p>
-                  </a:txBody>
-                  <a:tcPr marL="0" marR="0" marT="0" marB="0" anchor="ctr"/>
-                </a:tc>
-              </a:tr>
-              <a:tr h="257621">
-                <a:tc>
-                  <a:txBody>
-                    <a:bodyPr/>
-                    <a:lstStyle/>
-                    <a:p>
-                      <a:pPr algn="ctr"/>
-                      <a:r>
-                        <a:rPr lang="en-US" noProof="0" dirty="0" smtClean="0"/>
-                        <a:t>21</a:t>
-                      </a:r>
-                      <a:endParaRPr lang="en-US" noProof="0" dirty="0"/>
-                    </a:p>
-                  </a:txBody>
-                  <a:tcPr marL="0" marR="0" marT="0" marB="0" anchor="ctr"/>
-                </a:tc>
-                <a:tc>
-                  <a:txBody>
-                    <a:bodyPr/>
-                    <a:lstStyle/>
-                    <a:p>
-                      <a:pPr algn="ctr"/>
-                      <a:r>
-                        <a:rPr lang="en-US" noProof="0" dirty="0" smtClean="0"/>
-                        <a:t>-</a:t>
-                      </a:r>
-                      <a:endParaRPr lang="en-US" noProof="0" dirty="0"/>
-                    </a:p>
-                  </a:txBody>
-                  <a:tcPr marL="0" marR="0" marT="0" marB="0" anchor="ctr"/>
-                </a:tc>
-              </a:tr>
-              <a:tr h="257621">
-                <a:tc>
-                  <a:txBody>
-                    <a:bodyPr/>
-                    <a:lstStyle/>
-                    <a:p>
-                      <a:pPr algn="ctr"/>
-                      <a:r>
-                        <a:rPr lang="en-US" noProof="0" dirty="0" smtClean="0"/>
-                        <a:t>22</a:t>
-                      </a:r>
-                      <a:endParaRPr lang="en-US" noProof="0" dirty="0"/>
-                    </a:p>
-                  </a:txBody>
-                  <a:tcPr marL="0" marR="0" marT="0" marB="0" anchor="ctr"/>
-                </a:tc>
-                <a:tc>
-                  <a:txBody>
-                    <a:bodyPr/>
-                    <a:lstStyle/>
-                    <a:p>
-                      <a:pPr algn="ctr"/>
-                      <a:r>
-                        <a:rPr lang="en-US" noProof="0" dirty="0" smtClean="0"/>
-                        <a:t>-</a:t>
-                      </a:r>
-                      <a:endParaRPr lang="en-US" noProof="0" dirty="0"/>
-                    </a:p>
-                  </a:txBody>
-                  <a:tcPr marL="0" marR="0" marT="0" marB="0" anchor="ctr"/>
-                </a:tc>
-              </a:tr>
-              <a:tr h="257621">
-                <a:tc>
-                  <a:txBody>
-                    <a:bodyPr/>
-                    <a:lstStyle/>
-                    <a:p>
-                      <a:pPr algn="ctr"/>
-                      <a:r>
-                        <a:rPr lang="en-US" noProof="0" dirty="0" smtClean="0"/>
-                        <a:t>23</a:t>
-                      </a:r>
-                      <a:endParaRPr lang="en-US" noProof="0" dirty="0"/>
-                    </a:p>
-                  </a:txBody>
-                  <a:tcPr marL="0" marR="0" marT="0" marB="0" anchor="ctr"/>
-                </a:tc>
-                <a:tc>
-                  <a:txBody>
-                    <a:bodyPr/>
-                    <a:lstStyle/>
-                    <a:p>
-                      <a:pPr algn="ctr"/>
-                      <a:r>
-                        <a:rPr lang="en-US" noProof="0" dirty="0" smtClean="0"/>
-                        <a:t>Toggle keystroke showing (green</a:t>
-                      </a:r>
-                      <a:r>
-                        <a:rPr lang="en-US" baseline="0" noProof="0" dirty="0" smtClean="0"/>
-                        <a:t> flash)</a:t>
-                      </a:r>
-                      <a:endParaRPr lang="en-US" noProof="0" dirty="0"/>
                     </a:p>
                   </a:txBody>
                   <a:tcPr marL="0" marR="0" marT="0" marB="0" anchor="ctr"/>
@@ -10043,6 +9548,234 @@
           </a:p>
         </p:txBody>
       </p:sp>
+      <p:sp>
+        <p:nvSpPr>
+          <p:cNvPr id="4" name="Textfeld 3"/>
+          <p:cNvSpPr txBox="1"/>
+          <p:nvPr/>
+        </p:nvSpPr>
+        <p:spPr>
+          <a:xfrm>
+            <a:off x="4033339" y="5009277"/>
+            <a:ext cx="300082" cy="369332"/>
+          </a:xfrm>
+          <a:prstGeom prst="rect">
+            <a:avLst/>
+          </a:prstGeom>
+          <a:noFill/>
+        </p:spPr>
+        <p:txBody>
+          <a:bodyPr wrap="none" rtlCol="0">
+            <a:spAutoFit/>
+          </a:bodyPr>
+          <a:lstStyle/>
+          <a:p>
+            <a:r>
+              <a:rPr lang="de-DE" dirty="0" smtClean="0"/>
+              <a:t>*</a:t>
+            </a:r>
+            <a:endParaRPr lang="de-DE" dirty="0"/>
+          </a:p>
+        </p:txBody>
+      </p:sp>
+      <p:graphicFrame>
+        <p:nvGraphicFramePr>
+          <p:cNvPr id="50" name="Tabelle 49"/>
+          <p:cNvGraphicFramePr>
+            <a:graphicFrameLocks noGrp="1"/>
+          </p:cNvGraphicFramePr>
+          <p:nvPr>
+            <p:extLst>
+              <p:ext uri="{D42A27DB-BD31-4B8C-83A1-F6EECF244321}">
+                <p14:modId xmlns:p14="http://schemas.microsoft.com/office/powerpoint/2010/main" val="4212234209"/>
+              </p:ext>
+            </p:extLst>
+          </p:nvPr>
+        </p:nvGraphicFramePr>
+        <p:xfrm>
+          <a:off x="4139952" y="5260850"/>
+          <a:ext cx="5004048" cy="1097280"/>
+        </p:xfrm>
+        <a:graphic>
+          <a:graphicData uri="http://schemas.openxmlformats.org/drawingml/2006/table">
+            <a:tbl>
+              <a:tblPr firstRow="1" firstCol="1" bandRow="1">
+                <a:tableStyleId>{5C22544A-7EE6-4342-B048-85BDC9FD1C3A}</a:tableStyleId>
+              </a:tblPr>
+              <a:tblGrid>
+                <a:gridCol w="612741"/>
+                <a:gridCol w="4391307"/>
+              </a:tblGrid>
+              <a:tr h="257621">
+                <a:tc>
+                  <a:txBody>
+                    <a:bodyPr/>
+                    <a:lstStyle/>
+                    <a:p>
+                      <a:pPr algn="ctr"/>
+                      <a:r>
+                        <a:rPr lang="en-US" sz="1800" kern="1200" noProof="0" dirty="0" smtClean="0">
+                          <a:solidFill>
+                            <a:schemeClr val="bg1"/>
+                          </a:solidFill>
+                          <a:latin typeface="+mn-lt"/>
+                          <a:ea typeface="+mn-ea"/>
+                          <a:cs typeface="+mn-cs"/>
+                        </a:rPr>
+                        <a:t>Key</a:t>
+                      </a:r>
+                      <a:endParaRPr lang="en-US" sz="1800" kern="1200" noProof="0" dirty="0">
+                        <a:solidFill>
+                          <a:schemeClr val="bg1"/>
+                        </a:solidFill>
+                        <a:latin typeface="+mn-lt"/>
+                        <a:ea typeface="+mn-ea"/>
+                        <a:cs typeface="+mn-cs"/>
+                      </a:endParaRPr>
+                    </a:p>
+                  </a:txBody>
+                  <a:tcPr marL="0" marR="0" marT="0" marB="0" anchor="ctr"/>
+                </a:tc>
+                <a:tc>
+                  <a:txBody>
+                    <a:bodyPr/>
+                    <a:lstStyle/>
+                    <a:p>
+                      <a:pPr algn="ctr"/>
+                      <a:r>
+                        <a:rPr lang="en-US" sz="1800" kern="1200" noProof="0" dirty="0" smtClean="0">
+                          <a:solidFill>
+                            <a:schemeClr val="bg1"/>
+                          </a:solidFill>
+                          <a:latin typeface="+mn-lt"/>
+                          <a:ea typeface="+mn-ea"/>
+                          <a:cs typeface="+mn-cs"/>
+                        </a:rPr>
+                        <a:t>Strip</a:t>
+                      </a:r>
+                      <a:r>
+                        <a:rPr lang="en-US" sz="1800" kern="1200" baseline="0" noProof="0" dirty="0" smtClean="0">
+                          <a:solidFill>
+                            <a:schemeClr val="bg1"/>
+                          </a:solidFill>
+                          <a:latin typeface="+mn-lt"/>
+                          <a:ea typeface="+mn-ea"/>
+                          <a:cs typeface="+mn-cs"/>
+                        </a:rPr>
+                        <a:t> turned on</a:t>
+                      </a:r>
+                      <a:endParaRPr lang="en-US" sz="1800" kern="1200" noProof="0" dirty="0">
+                        <a:solidFill>
+                          <a:schemeClr val="bg1"/>
+                        </a:solidFill>
+                        <a:latin typeface="+mn-lt"/>
+                        <a:ea typeface="+mn-ea"/>
+                        <a:cs typeface="+mn-cs"/>
+                      </a:endParaRPr>
+                    </a:p>
+                  </a:txBody>
+                  <a:tcPr marL="0" marR="0" marT="0" marB="0" anchor="ctr"/>
+                </a:tc>
+              </a:tr>
+              <a:tr h="257621">
+                <a:tc>
+                  <a:txBody>
+                    <a:bodyPr/>
+                    <a:lstStyle/>
+                    <a:p>
+                      <a:pPr algn="ctr"/>
+                      <a:r>
+                        <a:rPr lang="en-US" noProof="0" dirty="0" smtClean="0"/>
+                        <a:t>1 or 2</a:t>
+                      </a:r>
+                      <a:endParaRPr lang="en-US" noProof="0" dirty="0"/>
+                    </a:p>
+                  </a:txBody>
+                  <a:tcPr marL="0" marR="0" marT="0" marB="0" anchor="ctr"/>
+                </a:tc>
+                <a:tc>
+                  <a:txBody>
+                    <a:bodyPr/>
+                    <a:lstStyle/>
+                    <a:p>
+                      <a:pPr algn="ctr"/>
+                      <a:r>
+                        <a:rPr lang="en-US" noProof="0" dirty="0" smtClean="0"/>
+                        <a:t>Save current color as backlight color</a:t>
+                      </a:r>
+                    </a:p>
+                  </a:txBody>
+                  <a:tcPr marL="0" marR="0" marT="0" marB="0" anchor="ctr"/>
+                </a:tc>
+              </a:tr>
+              <a:tr h="257621">
+                <a:tc>
+                  <a:txBody>
+                    <a:bodyPr/>
+                    <a:lstStyle/>
+                    <a:p>
+                      <a:pPr algn="ctr"/>
+                      <a:r>
+                        <a:rPr lang="en-US" noProof="0" dirty="0" smtClean="0"/>
+                        <a:t>12</a:t>
+                      </a:r>
+                      <a:endParaRPr lang="en-US" noProof="0" dirty="0"/>
+                    </a:p>
+                  </a:txBody>
+                  <a:tcPr marL="0" marR="0" marT="0" marB="0" anchor="ctr"/>
+                </a:tc>
+                <a:tc>
+                  <a:txBody>
+                    <a:bodyPr/>
+                    <a:lstStyle/>
+                    <a:p>
+                      <a:pPr algn="ctr"/>
+                      <a:r>
+                        <a:rPr lang="en-US" noProof="0" dirty="0" smtClean="0"/>
+                        <a:t>Save current color as custom color</a:t>
+                      </a:r>
+                      <a:endParaRPr lang="en-US" noProof="0" dirty="0"/>
+                    </a:p>
+                  </a:txBody>
+                  <a:tcPr marL="0" marR="0" marT="0" marB="0" anchor="ctr"/>
+                </a:tc>
+              </a:tr>
+              <a:tr h="257621">
+                <a:tc>
+                  <a:txBody>
+                    <a:bodyPr/>
+                    <a:lstStyle/>
+                    <a:p>
+                      <a:pPr algn="ctr"/>
+                      <a:r>
+                        <a:rPr lang="en-US" noProof="0" dirty="0" smtClean="0"/>
+                        <a:t>Other</a:t>
+                      </a:r>
+                      <a:endParaRPr lang="en-US" noProof="0" dirty="0"/>
+                    </a:p>
+                  </a:txBody>
+                  <a:tcPr marL="0" marR="0" marT="0" marB="0" anchor="ctr"/>
+                </a:tc>
+                <a:tc>
+                  <a:txBody>
+                    <a:bodyPr/>
+                    <a:lstStyle/>
+                    <a:p>
+                      <a:pPr algn="ctr"/>
+                      <a:r>
+                        <a:rPr lang="en-US" noProof="0" dirty="0" smtClean="0"/>
+                        <a:t>Return to settings mode</a:t>
+                      </a:r>
+                      <a:endParaRPr lang="en-US" noProof="0" dirty="0"/>
+                    </a:p>
+                  </a:txBody>
+                  <a:tcPr marL="0" marR="0" marT="0" marB="0" anchor="ctr"/>
+                </a:tc>
+              </a:tr>
+            </a:tbl>
+          </a:graphicData>
+        </a:graphic>
+      </p:graphicFrame>
     </p:spTree>
     <p:extLst>
       <p:ext uri="{BB962C8B-B14F-4D97-AF65-F5344CB8AC3E}">

</xml_diff>